<commit_message>
Modifications to the presentation as per prescribed format.
</commit_message>
<xml_diff>
--- a/Phase1.pptx
+++ b/Phase1.pptx
@@ -4,12 +4,16 @@
   <p:sldMasterIdLst>
     <p:sldMasterId id="2147483648" r:id="rId1"/>
   </p:sldMasterIdLst>
+  <p:notesMasterIdLst>
+    <p:notesMasterId r:id="rId8"/>
+  </p:notesMasterIdLst>
   <p:sldIdLst>
     <p:sldId id="256" r:id="rId2"/>
     <p:sldId id="257" r:id="rId3"/>
     <p:sldId id="258" r:id="rId4"/>
     <p:sldId id="259" r:id="rId5"/>
     <p:sldId id="260" r:id="rId6"/>
+    <p:sldId id="261" r:id="rId7"/>
   </p:sldIdLst>
   <p:sldSz cx="9144000" cy="6858000" type="screen4x3"/>
   <p:notesSz cx="6858000" cy="9144000"/>
@@ -109,6 +113,440 @@
     </a:lvl9pPr>
   </p:defaultTextStyle>
 </p:presentation>
+</file>
+
+<file path=ppt/notesMasters/notesMaster1.xml><?xml version="1.0" encoding="utf-8"?>
+<p:notesMaster xmlns:a="http://schemas.openxmlformats.org/drawingml/2006/main" xmlns:r="http://schemas.openxmlformats.org/officeDocument/2006/relationships" xmlns:p="http://schemas.openxmlformats.org/presentationml/2006/main">
+  <p:cSld>
+    <p:bg>
+      <p:bgRef idx="1001">
+        <a:schemeClr val="bg1"/>
+      </p:bgRef>
+    </p:bg>
+    <p:spTree>
+      <p:nvGrpSpPr>
+        <p:cNvPr id="1" name=""/>
+        <p:cNvGrpSpPr/>
+        <p:nvPr/>
+      </p:nvGrpSpPr>
+      <p:grpSpPr>
+        <a:xfrm>
+          <a:off x="0" y="0"/>
+          <a:ext cx="0" cy="0"/>
+          <a:chOff x="0" y="0"/>
+          <a:chExt cx="0" cy="0"/>
+        </a:xfrm>
+      </p:grpSpPr>
+      <p:sp>
+        <p:nvSpPr>
+          <p:cNvPr id="2" name="Header Placeholder 1"/>
+          <p:cNvSpPr>
+            <a:spLocks noGrp="1"/>
+          </p:cNvSpPr>
+          <p:nvPr>
+            <p:ph type="hdr" sz="quarter"/>
+          </p:nvPr>
+        </p:nvSpPr>
+        <p:spPr>
+          <a:xfrm>
+            <a:off x="0" y="0"/>
+            <a:ext cx="2971800" cy="457200"/>
+          </a:xfrm>
+          <a:prstGeom prst="rect">
+            <a:avLst/>
+          </a:prstGeom>
+        </p:spPr>
+        <p:txBody>
+          <a:bodyPr vert="horz" lIns="91440" tIns="45720" rIns="91440" bIns="45720" rtlCol="0"/>
+          <a:lstStyle>
+            <a:lvl1pPr algn="l">
+              <a:defRPr sz="1200"/>
+            </a:lvl1pPr>
+          </a:lstStyle>
+          <a:p>
+            <a:endParaRPr lang="en-US"/>
+          </a:p>
+        </p:txBody>
+      </p:sp>
+      <p:sp>
+        <p:nvSpPr>
+          <p:cNvPr id="3" name="Date Placeholder 2"/>
+          <p:cNvSpPr>
+            <a:spLocks noGrp="1"/>
+          </p:cNvSpPr>
+          <p:nvPr>
+            <p:ph type="dt" idx="1"/>
+          </p:nvPr>
+        </p:nvSpPr>
+        <p:spPr>
+          <a:xfrm>
+            <a:off x="3884613" y="0"/>
+            <a:ext cx="2971800" cy="457200"/>
+          </a:xfrm>
+          <a:prstGeom prst="rect">
+            <a:avLst/>
+          </a:prstGeom>
+        </p:spPr>
+        <p:txBody>
+          <a:bodyPr vert="horz" lIns="91440" tIns="45720" rIns="91440" bIns="45720" rtlCol="0"/>
+          <a:lstStyle>
+            <a:lvl1pPr algn="r">
+              <a:defRPr sz="1200"/>
+            </a:lvl1pPr>
+          </a:lstStyle>
+          <a:p>
+            <a:fld id="{72314419-80E1-4877-ABC0-460111A058D1}" type="datetimeFigureOut">
+              <a:rPr lang="en-US" smtClean="0"/>
+              <a:t>10/19/2015</a:t>
+            </a:fld>
+            <a:endParaRPr lang="en-US"/>
+          </a:p>
+        </p:txBody>
+      </p:sp>
+      <p:sp>
+        <p:nvSpPr>
+          <p:cNvPr id="4" name="Slide Image Placeholder 3"/>
+          <p:cNvSpPr>
+            <a:spLocks noGrp="1" noRot="1" noChangeAspect="1"/>
+          </p:cNvSpPr>
+          <p:nvPr>
+            <p:ph type="sldImg" idx="2"/>
+          </p:nvPr>
+        </p:nvSpPr>
+        <p:spPr>
+          <a:xfrm>
+            <a:off x="1143000" y="685800"/>
+            <a:ext cx="4572000" cy="3429000"/>
+          </a:xfrm>
+          <a:prstGeom prst="rect">
+            <a:avLst/>
+          </a:prstGeom>
+          <a:noFill/>
+          <a:ln w="12700">
+            <a:solidFill>
+              <a:prstClr val="black"/>
+            </a:solidFill>
+          </a:ln>
+        </p:spPr>
+        <p:txBody>
+          <a:bodyPr vert="horz" lIns="91440" tIns="45720" rIns="91440" bIns="45720" rtlCol="0" anchor="ctr"/>
+          <a:lstStyle/>
+          <a:p>
+            <a:endParaRPr lang="en-US"/>
+          </a:p>
+        </p:txBody>
+      </p:sp>
+      <p:sp>
+        <p:nvSpPr>
+          <p:cNvPr id="5" name="Notes Placeholder 4"/>
+          <p:cNvSpPr>
+            <a:spLocks noGrp="1"/>
+          </p:cNvSpPr>
+          <p:nvPr>
+            <p:ph type="body" sz="quarter" idx="3"/>
+          </p:nvPr>
+        </p:nvSpPr>
+        <p:spPr>
+          <a:xfrm>
+            <a:off x="685800" y="4343400"/>
+            <a:ext cx="5486400" cy="4114800"/>
+          </a:xfrm>
+          <a:prstGeom prst="rect">
+            <a:avLst/>
+          </a:prstGeom>
+        </p:spPr>
+        <p:txBody>
+          <a:bodyPr vert="horz" lIns="91440" tIns="45720" rIns="91440" bIns="45720" rtlCol="0"/>
+          <a:lstStyle/>
+          <a:p>
+            <a:pPr lvl="0"/>
+            <a:r>
+              <a:rPr lang="en-US" smtClean="0"/>
+              <a:t>Click to edit Master text styles</a:t>
+            </a:r>
+          </a:p>
+          <a:p>
+            <a:pPr lvl="1"/>
+            <a:r>
+              <a:rPr lang="en-US" smtClean="0"/>
+              <a:t>Second level</a:t>
+            </a:r>
+          </a:p>
+          <a:p>
+            <a:pPr lvl="2"/>
+            <a:r>
+              <a:rPr lang="en-US" smtClean="0"/>
+              <a:t>Third level</a:t>
+            </a:r>
+          </a:p>
+          <a:p>
+            <a:pPr lvl="3"/>
+            <a:r>
+              <a:rPr lang="en-US" smtClean="0"/>
+              <a:t>Fourth level</a:t>
+            </a:r>
+          </a:p>
+          <a:p>
+            <a:pPr lvl="4"/>
+            <a:r>
+              <a:rPr lang="en-US" smtClean="0"/>
+              <a:t>Fifth level</a:t>
+            </a:r>
+            <a:endParaRPr lang="en-US"/>
+          </a:p>
+        </p:txBody>
+      </p:sp>
+      <p:sp>
+        <p:nvSpPr>
+          <p:cNvPr id="6" name="Footer Placeholder 5"/>
+          <p:cNvSpPr>
+            <a:spLocks noGrp="1"/>
+          </p:cNvSpPr>
+          <p:nvPr>
+            <p:ph type="ftr" sz="quarter" idx="4"/>
+          </p:nvPr>
+        </p:nvSpPr>
+        <p:spPr>
+          <a:xfrm>
+            <a:off x="0" y="8685213"/>
+            <a:ext cx="2971800" cy="457200"/>
+          </a:xfrm>
+          <a:prstGeom prst="rect">
+            <a:avLst/>
+          </a:prstGeom>
+        </p:spPr>
+        <p:txBody>
+          <a:bodyPr vert="horz" lIns="91440" tIns="45720" rIns="91440" bIns="45720" rtlCol="0" anchor="b"/>
+          <a:lstStyle>
+            <a:lvl1pPr algn="l">
+              <a:defRPr sz="1200"/>
+            </a:lvl1pPr>
+          </a:lstStyle>
+          <a:p>
+            <a:endParaRPr lang="en-US"/>
+          </a:p>
+        </p:txBody>
+      </p:sp>
+      <p:sp>
+        <p:nvSpPr>
+          <p:cNvPr id="7" name="Slide Number Placeholder 6"/>
+          <p:cNvSpPr>
+            <a:spLocks noGrp="1"/>
+          </p:cNvSpPr>
+          <p:nvPr>
+            <p:ph type="sldNum" sz="quarter" idx="5"/>
+          </p:nvPr>
+        </p:nvSpPr>
+        <p:spPr>
+          <a:xfrm>
+            <a:off x="3884613" y="8685213"/>
+            <a:ext cx="2971800" cy="457200"/>
+          </a:xfrm>
+          <a:prstGeom prst="rect">
+            <a:avLst/>
+          </a:prstGeom>
+        </p:spPr>
+        <p:txBody>
+          <a:bodyPr vert="horz" lIns="91440" tIns="45720" rIns="91440" bIns="45720" rtlCol="0" anchor="b"/>
+          <a:lstStyle>
+            <a:lvl1pPr algn="r">
+              <a:defRPr sz="1200"/>
+            </a:lvl1pPr>
+          </a:lstStyle>
+          <a:p>
+            <a:fld id="{7163DB4C-57FC-4771-9266-917FB678F4D6}" type="slidenum">
+              <a:rPr lang="en-US" smtClean="0"/>
+              <a:t>‹#›</a:t>
+            </a:fld>
+            <a:endParaRPr lang="en-US"/>
+          </a:p>
+        </p:txBody>
+      </p:sp>
+    </p:spTree>
+    <p:extLst>
+      <p:ext uri="{BB962C8B-B14F-4D97-AF65-F5344CB8AC3E}">
+        <p14:creationId xmlns:p14="http://schemas.microsoft.com/office/powerpoint/2010/main" val="1767440642"/>
+      </p:ext>
+    </p:extLst>
+  </p:cSld>
+  <p:clrMap bg1="lt1" tx1="dk1" bg2="lt2" tx2="dk2" accent1="accent1" accent2="accent2" accent3="accent3" accent4="accent4" accent5="accent5" accent6="accent6" hlink="hlink" folHlink="folHlink"/>
+  <p:notesStyle>
+    <a:lvl1pPr marL="0" algn="l" defTabSz="914400" rtl="0" eaLnBrk="1" latinLnBrk="0" hangingPunct="1">
+      <a:defRPr sz="1200" kern="1200">
+        <a:solidFill>
+          <a:schemeClr val="tx1"/>
+        </a:solidFill>
+        <a:latin typeface="+mn-lt"/>
+        <a:ea typeface="+mn-ea"/>
+        <a:cs typeface="+mn-cs"/>
+      </a:defRPr>
+    </a:lvl1pPr>
+    <a:lvl2pPr marL="457200" algn="l" defTabSz="914400" rtl="0" eaLnBrk="1" latinLnBrk="0" hangingPunct="1">
+      <a:defRPr sz="1200" kern="1200">
+        <a:solidFill>
+          <a:schemeClr val="tx1"/>
+        </a:solidFill>
+        <a:latin typeface="+mn-lt"/>
+        <a:ea typeface="+mn-ea"/>
+        <a:cs typeface="+mn-cs"/>
+      </a:defRPr>
+    </a:lvl2pPr>
+    <a:lvl3pPr marL="914400" algn="l" defTabSz="914400" rtl="0" eaLnBrk="1" latinLnBrk="0" hangingPunct="1">
+      <a:defRPr sz="1200" kern="1200">
+        <a:solidFill>
+          <a:schemeClr val="tx1"/>
+        </a:solidFill>
+        <a:latin typeface="+mn-lt"/>
+        <a:ea typeface="+mn-ea"/>
+        <a:cs typeface="+mn-cs"/>
+      </a:defRPr>
+    </a:lvl3pPr>
+    <a:lvl4pPr marL="1371600" algn="l" defTabSz="914400" rtl="0" eaLnBrk="1" latinLnBrk="0" hangingPunct="1">
+      <a:defRPr sz="1200" kern="1200">
+        <a:solidFill>
+          <a:schemeClr val="tx1"/>
+        </a:solidFill>
+        <a:latin typeface="+mn-lt"/>
+        <a:ea typeface="+mn-ea"/>
+        <a:cs typeface="+mn-cs"/>
+      </a:defRPr>
+    </a:lvl4pPr>
+    <a:lvl5pPr marL="1828800" algn="l" defTabSz="914400" rtl="0" eaLnBrk="1" latinLnBrk="0" hangingPunct="1">
+      <a:defRPr sz="1200" kern="1200">
+        <a:solidFill>
+          <a:schemeClr val="tx1"/>
+        </a:solidFill>
+        <a:latin typeface="+mn-lt"/>
+        <a:ea typeface="+mn-ea"/>
+        <a:cs typeface="+mn-cs"/>
+      </a:defRPr>
+    </a:lvl5pPr>
+    <a:lvl6pPr marL="2286000" algn="l" defTabSz="914400" rtl="0" eaLnBrk="1" latinLnBrk="0" hangingPunct="1">
+      <a:defRPr sz="1200" kern="1200">
+        <a:solidFill>
+          <a:schemeClr val="tx1"/>
+        </a:solidFill>
+        <a:latin typeface="+mn-lt"/>
+        <a:ea typeface="+mn-ea"/>
+        <a:cs typeface="+mn-cs"/>
+      </a:defRPr>
+    </a:lvl6pPr>
+    <a:lvl7pPr marL="2743200" algn="l" defTabSz="914400" rtl="0" eaLnBrk="1" latinLnBrk="0" hangingPunct="1">
+      <a:defRPr sz="1200" kern="1200">
+        <a:solidFill>
+          <a:schemeClr val="tx1"/>
+        </a:solidFill>
+        <a:latin typeface="+mn-lt"/>
+        <a:ea typeface="+mn-ea"/>
+        <a:cs typeface="+mn-cs"/>
+      </a:defRPr>
+    </a:lvl7pPr>
+    <a:lvl8pPr marL="3200400" algn="l" defTabSz="914400" rtl="0" eaLnBrk="1" latinLnBrk="0" hangingPunct="1">
+      <a:defRPr sz="1200" kern="1200">
+        <a:solidFill>
+          <a:schemeClr val="tx1"/>
+        </a:solidFill>
+        <a:latin typeface="+mn-lt"/>
+        <a:ea typeface="+mn-ea"/>
+        <a:cs typeface="+mn-cs"/>
+      </a:defRPr>
+    </a:lvl8pPr>
+    <a:lvl9pPr marL="3657600" algn="l" defTabSz="914400" rtl="0" eaLnBrk="1" latinLnBrk="0" hangingPunct="1">
+      <a:defRPr sz="1200" kern="1200">
+        <a:solidFill>
+          <a:schemeClr val="tx1"/>
+        </a:solidFill>
+        <a:latin typeface="+mn-lt"/>
+        <a:ea typeface="+mn-ea"/>
+        <a:cs typeface="+mn-cs"/>
+      </a:defRPr>
+    </a:lvl9pPr>
+  </p:notesStyle>
+</p:notesMaster>
+</file>
+
+<file path=ppt/notesSlides/notesSlide1.xml><?xml version="1.0" encoding="utf-8"?>
+<p:notes xmlns:a="http://schemas.openxmlformats.org/drawingml/2006/main" xmlns:r="http://schemas.openxmlformats.org/officeDocument/2006/relationships" xmlns:p="http://schemas.openxmlformats.org/presentationml/2006/main">
+  <p:cSld>
+    <p:spTree>
+      <p:nvGrpSpPr>
+        <p:cNvPr id="1" name=""/>
+        <p:cNvGrpSpPr/>
+        <p:nvPr/>
+      </p:nvGrpSpPr>
+      <p:grpSpPr>
+        <a:xfrm>
+          <a:off x="0" y="0"/>
+          <a:ext cx="0" cy="0"/>
+          <a:chOff x="0" y="0"/>
+          <a:chExt cx="0" cy="0"/>
+        </a:xfrm>
+      </p:grpSpPr>
+      <p:sp>
+        <p:nvSpPr>
+          <p:cNvPr id="2" name="Slide Image Placeholder 1"/>
+          <p:cNvSpPr>
+            <a:spLocks noGrp="1" noRot="1" noChangeAspect="1"/>
+          </p:cNvSpPr>
+          <p:nvPr>
+            <p:ph type="sldImg"/>
+          </p:nvPr>
+        </p:nvSpPr>
+        <p:spPr/>
+      </p:sp>
+      <p:sp>
+        <p:nvSpPr>
+          <p:cNvPr id="3" name="Notes Placeholder 2"/>
+          <p:cNvSpPr>
+            <a:spLocks noGrp="1"/>
+          </p:cNvSpPr>
+          <p:nvPr>
+            <p:ph type="body" idx="1"/>
+          </p:nvPr>
+        </p:nvSpPr>
+        <p:spPr/>
+        <p:txBody>
+          <a:bodyPr/>
+          <a:lstStyle/>
+          <a:p>
+            <a:endParaRPr lang="en-US"/>
+          </a:p>
+        </p:txBody>
+      </p:sp>
+      <p:sp>
+        <p:nvSpPr>
+          <p:cNvPr id="4" name="Slide Number Placeholder 3"/>
+          <p:cNvSpPr>
+            <a:spLocks noGrp="1"/>
+          </p:cNvSpPr>
+          <p:nvPr>
+            <p:ph type="sldNum" sz="quarter" idx="10"/>
+          </p:nvPr>
+        </p:nvSpPr>
+        <p:spPr/>
+        <p:txBody>
+          <a:bodyPr/>
+          <a:lstStyle/>
+          <a:p>
+            <a:fld id="{7163DB4C-57FC-4771-9266-917FB678F4D6}" type="slidenum">
+              <a:rPr lang="en-US" smtClean="0"/>
+              <a:t>1</a:t>
+            </a:fld>
+            <a:endParaRPr lang="en-US"/>
+          </a:p>
+        </p:txBody>
+      </p:sp>
+    </p:spTree>
+    <p:extLst>
+      <p:ext uri="{BB962C8B-B14F-4D97-AF65-F5344CB8AC3E}">
+        <p14:creationId xmlns:p14="http://schemas.microsoft.com/office/powerpoint/2010/main" val="672027793"/>
+      </p:ext>
+    </p:extLst>
+  </p:cSld>
+  <p:clrMapOvr>
+    <a:masterClrMapping/>
+  </p:clrMapOvr>
+</p:notes>
 </file>
 
 <file path=ppt/slideLayouts/slideLayout1.xml><?xml version="1.0" encoding="utf-8"?>
@@ -290,9 +728,9 @@
           <a:bodyPr/>
           <a:lstStyle/>
           <a:p>
-            <a:fld id="{E1D370B5-54E5-4EA9-8255-D83A552F69A8}" type="datetimeFigureOut">
-              <a:rPr lang="en-US" smtClean="0"/>
-              <a:t>10/18/2015</a:t>
+            <a:fld id="{E781535A-D48B-48A7-B49A-1E7751333EFA}" type="datetime1">
+              <a:rPr lang="en-US" smtClean="0"/>
+              <a:t>10/19/2015</a:t>
             </a:fld>
             <a:endParaRPr lang="en-US"/>
           </a:p>
@@ -460,9 +898,9 @@
           <a:bodyPr/>
           <a:lstStyle/>
           <a:p>
-            <a:fld id="{E1D370B5-54E5-4EA9-8255-D83A552F69A8}" type="datetimeFigureOut">
-              <a:rPr lang="en-US" smtClean="0"/>
-              <a:t>10/18/2015</a:t>
+            <a:fld id="{0AA89D1E-769E-4276-8C8F-037A9C4117CB}" type="datetime1">
+              <a:rPr lang="en-US" smtClean="0"/>
+              <a:t>10/19/2015</a:t>
             </a:fld>
             <a:endParaRPr lang="en-US"/>
           </a:p>
@@ -640,9 +1078,9 @@
           <a:bodyPr/>
           <a:lstStyle/>
           <a:p>
-            <a:fld id="{E1D370B5-54E5-4EA9-8255-D83A552F69A8}" type="datetimeFigureOut">
-              <a:rPr lang="en-US" smtClean="0"/>
-              <a:t>10/18/2015</a:t>
+            <a:fld id="{3655468C-B3A9-4FF3-A9CD-9B8B8274C925}" type="datetime1">
+              <a:rPr lang="en-US" smtClean="0"/>
+              <a:t>10/19/2015</a:t>
             </a:fld>
             <a:endParaRPr lang="en-US"/>
           </a:p>
@@ -810,9 +1248,9 @@
           <a:bodyPr/>
           <a:lstStyle/>
           <a:p>
-            <a:fld id="{E1D370B5-54E5-4EA9-8255-D83A552F69A8}" type="datetimeFigureOut">
-              <a:rPr lang="en-US" smtClean="0"/>
-              <a:t>10/18/2015</a:t>
+            <a:fld id="{53A4B5D5-C6AF-4C11-9783-D1A98AE4D335}" type="datetime1">
+              <a:rPr lang="en-US" smtClean="0"/>
+              <a:t>10/19/2015</a:t>
             </a:fld>
             <a:endParaRPr lang="en-US"/>
           </a:p>
@@ -1056,9 +1494,9 @@
           <a:bodyPr/>
           <a:lstStyle/>
           <a:p>
-            <a:fld id="{E1D370B5-54E5-4EA9-8255-D83A552F69A8}" type="datetimeFigureOut">
-              <a:rPr lang="en-US" smtClean="0"/>
-              <a:t>10/18/2015</a:t>
+            <a:fld id="{312CC955-ED41-4889-9F2B-1CAE21CDC64E}" type="datetime1">
+              <a:rPr lang="en-US" smtClean="0"/>
+              <a:t>10/19/2015</a:t>
             </a:fld>
             <a:endParaRPr lang="en-US"/>
           </a:p>
@@ -1344,9 +1782,9 @@
           <a:bodyPr/>
           <a:lstStyle/>
           <a:p>
-            <a:fld id="{E1D370B5-54E5-4EA9-8255-D83A552F69A8}" type="datetimeFigureOut">
-              <a:rPr lang="en-US" smtClean="0"/>
-              <a:t>10/18/2015</a:t>
+            <a:fld id="{1E8437B8-E8B5-4AD3-A027-413D91F049D1}" type="datetime1">
+              <a:rPr lang="en-US" smtClean="0"/>
+              <a:t>10/19/2015</a:t>
             </a:fld>
             <a:endParaRPr lang="en-US"/>
           </a:p>
@@ -1766,9 +2204,9 @@
           <a:bodyPr/>
           <a:lstStyle/>
           <a:p>
-            <a:fld id="{E1D370B5-54E5-4EA9-8255-D83A552F69A8}" type="datetimeFigureOut">
-              <a:rPr lang="en-US" smtClean="0"/>
-              <a:t>10/18/2015</a:t>
+            <a:fld id="{CB25B774-5999-4727-AD21-217239D27FD7}" type="datetime1">
+              <a:rPr lang="en-US" smtClean="0"/>
+              <a:t>10/19/2015</a:t>
             </a:fld>
             <a:endParaRPr lang="en-US"/>
           </a:p>
@@ -1884,9 +2322,9 @@
           <a:bodyPr/>
           <a:lstStyle/>
           <a:p>
-            <a:fld id="{E1D370B5-54E5-4EA9-8255-D83A552F69A8}" type="datetimeFigureOut">
-              <a:rPr lang="en-US" smtClean="0"/>
-              <a:t>10/18/2015</a:t>
+            <a:fld id="{9739BEAB-8DF6-476C-A86B-6B2B142416C0}" type="datetime1">
+              <a:rPr lang="en-US" smtClean="0"/>
+              <a:t>10/19/2015</a:t>
             </a:fld>
             <a:endParaRPr lang="en-US"/>
           </a:p>
@@ -1979,9 +2417,9 @@
           <a:bodyPr/>
           <a:lstStyle/>
           <a:p>
-            <a:fld id="{E1D370B5-54E5-4EA9-8255-D83A552F69A8}" type="datetimeFigureOut">
-              <a:rPr lang="en-US" smtClean="0"/>
-              <a:t>10/18/2015</a:t>
+            <a:fld id="{D6F5DD38-6BF6-4572-A40C-E40B6B2E7A12}" type="datetime1">
+              <a:rPr lang="en-US" smtClean="0"/>
+              <a:t>10/19/2015</a:t>
             </a:fld>
             <a:endParaRPr lang="en-US"/>
           </a:p>
@@ -2256,9 +2694,9 @@
           <a:bodyPr/>
           <a:lstStyle/>
           <a:p>
-            <a:fld id="{E1D370B5-54E5-4EA9-8255-D83A552F69A8}" type="datetimeFigureOut">
-              <a:rPr lang="en-US" smtClean="0"/>
-              <a:t>10/18/2015</a:t>
+            <a:fld id="{FEBD529E-DF6B-45CB-83FD-94394B681A78}" type="datetime1">
+              <a:rPr lang="en-US" smtClean="0"/>
+              <a:t>10/19/2015</a:t>
             </a:fld>
             <a:endParaRPr lang="en-US"/>
           </a:p>
@@ -2509,9 +2947,9 @@
           <a:bodyPr/>
           <a:lstStyle/>
           <a:p>
-            <a:fld id="{E1D370B5-54E5-4EA9-8255-D83A552F69A8}" type="datetimeFigureOut">
-              <a:rPr lang="en-US" smtClean="0"/>
-              <a:t>10/18/2015</a:t>
+            <a:fld id="{F912034B-7DB4-432D-9ACA-49B16BE41F0E}" type="datetime1">
+              <a:rPr lang="en-US" smtClean="0"/>
+              <a:t>10/19/2015</a:t>
             </a:fld>
             <a:endParaRPr lang="en-US"/>
           </a:p>
@@ -2722,9 +3160,9 @@
             </a:lvl1pPr>
           </a:lstStyle>
           <a:p>
-            <a:fld id="{E1D370B5-54E5-4EA9-8255-D83A552F69A8}" type="datetimeFigureOut">
-              <a:rPr lang="en-US" smtClean="0"/>
-              <a:t>10/18/2015</a:t>
+            <a:fld id="{FED37F6F-F146-4934-B439-7103E4A2C205}" type="datetime1">
+              <a:rPr lang="en-US" smtClean="0"/>
+              <a:t>10/19/2015</a:t>
             </a:fld>
             <a:endParaRPr lang="en-US"/>
           </a:p>
@@ -2829,6 +3267,7 @@
     <p:sldLayoutId id="2147483658" r:id="rId10"/>
     <p:sldLayoutId id="2147483659" r:id="rId11"/>
   </p:sldLayoutIdLst>
+  <p:hf hdr="0" ftr="0" dt="0"/>
   <p:txStyles>
     <p:titleStyle>
       <a:lvl1pPr algn="ctr" defTabSz="914400" rtl="0" eaLnBrk="1" latinLnBrk="0" hangingPunct="1">
@@ -3144,6 +3583,29 @@
           </a:p>
         </p:txBody>
       </p:sp>
+      <p:sp>
+        <p:nvSpPr>
+          <p:cNvPr id="4" name="Slide Number Placeholder 3"/>
+          <p:cNvSpPr>
+            <a:spLocks noGrp="1"/>
+          </p:cNvSpPr>
+          <p:nvPr>
+            <p:ph type="sldNum" sz="quarter" idx="12"/>
+          </p:nvPr>
+        </p:nvSpPr>
+        <p:spPr/>
+        <p:txBody>
+          <a:bodyPr/>
+          <a:lstStyle/>
+          <a:p>
+            <a:fld id="{8D57FA42-4C96-40D0-968E-816322FE8D57}" type="slidenum">
+              <a:rPr lang="en-US" smtClean="0"/>
+              <a:t>1</a:t>
+            </a:fld>
+            <a:endParaRPr lang="en-US"/>
+          </a:p>
+        </p:txBody>
+      </p:sp>
     </p:spTree>
     <p:extLst>
       <p:ext uri="{BB962C8B-B14F-4D97-AF65-F5344CB8AC3E}">
@@ -3154,6 +3616,13 @@
   <p:clrMapOvr>
     <a:masterClrMapping/>
   </p:clrMapOvr>
+  <p:timing>
+    <p:tnLst>
+      <p:par>
+        <p:cTn id="1" dur="indefinite" restart="never" nodeType="tmRoot"/>
+      </p:par>
+    </p:tnLst>
+  </p:timing>
 </p:sld>
 </file>
 
@@ -3418,8 +3887,8 @@
           </p:nvSpPr>
           <p:spPr>
             <a:xfrm>
-              <a:off x="5205846" y="2060864"/>
-              <a:ext cx="1752600" cy="1596736"/>
+              <a:off x="5029200" y="2060864"/>
+              <a:ext cx="2133600" cy="1596736"/>
             </a:xfrm>
             <a:prstGeom prst="diamond">
               <a:avLst/>
@@ -3458,8 +3927,13 @@
                     <a:schemeClr val="tx1"/>
                   </a:solidFill>
                 </a:rPr>
-                <a:t>User receives Email for Pending Approval</a:t>
+                <a:t>User Registration approved ? </a:t>
               </a:r>
+              <a:endParaRPr lang="en-US" sz="1400" dirty="0" smtClean="0">
+                <a:solidFill>
+                  <a:schemeClr val="tx1"/>
+                </a:solidFill>
+              </a:endParaRPr>
             </a:p>
           </p:txBody>
         </p:sp>
@@ -3809,8 +4283,8 @@
           </p:nvCxnSpPr>
           <p:spPr>
             <a:xfrm>
-              <a:off x="6958446" y="2859232"/>
-              <a:ext cx="1004454" cy="306532"/>
+              <a:off x="7162800" y="2859232"/>
+              <a:ext cx="800100" cy="306532"/>
             </a:xfrm>
             <a:prstGeom prst="bentConnector2">
               <a:avLst/>
@@ -3846,7 +4320,7 @@
           <p:spPr>
             <a:xfrm rot="10800000" flipV="1">
               <a:off x="3467100" y="2859232"/>
-              <a:ext cx="1738746" cy="306532"/>
+              <a:ext cx="1562100" cy="306532"/>
             </a:xfrm>
             <a:prstGeom prst="bentConnector2">
               <a:avLst/>
@@ -4022,8 +4496,8 @@
           </p:nvSpPr>
           <p:spPr>
             <a:xfrm>
-              <a:off x="3609729" y="2274457"/>
-              <a:ext cx="1964192" cy="584775"/>
+              <a:off x="4469823" y="2443734"/>
+              <a:ext cx="452047" cy="338554"/>
             </a:xfrm>
             <a:prstGeom prst="rect">
               <a:avLst/>
@@ -4038,14 +4512,7 @@
             <a:p>
               <a:r>
                 <a:rPr lang="en-US" sz="1600" dirty="0" smtClean="0"/>
-                <a:t>Auth. Emp. approves </a:t>
-              </a:r>
-              <a:br>
-                <a:rPr lang="en-US" sz="1600" dirty="0" smtClean="0"/>
-              </a:br>
-              <a:r>
-                <a:rPr lang="en-US" sz="1600" dirty="0" smtClean="0"/>
-                <a:t>registration</a:t>
+                <a:t>Yes</a:t>
               </a:r>
               <a:endParaRPr lang="en-US" sz="1600" dirty="0"/>
             </a:p>
@@ -4059,8 +4526,8 @@
           </p:nvSpPr>
           <p:spPr>
             <a:xfrm>
-              <a:off x="6982691" y="2290623"/>
-              <a:ext cx="1714444" cy="584775"/>
+              <a:off x="7196051" y="2443734"/>
+              <a:ext cx="426720" cy="338554"/>
             </a:xfrm>
             <a:prstGeom prst="rect">
               <a:avLst/>
@@ -4075,14 +4542,7 @@
             <a:p>
               <a:r>
                 <a:rPr lang="en-US" sz="1600" dirty="0" smtClean="0"/>
-                <a:t>Auth. Emp. rejects</a:t>
-              </a:r>
-              <a:br>
-                <a:rPr lang="en-US" sz="1600" dirty="0" smtClean="0"/>
-              </a:br>
-              <a:r>
-                <a:rPr lang="en-US" sz="1600" dirty="0" smtClean="0"/>
-                <a:t>registration</a:t>
+                <a:t>No</a:t>
               </a:r>
               <a:endParaRPr lang="en-US" sz="1600" dirty="0"/>
             </a:p>
@@ -4119,6 +4579,29 @@
           </a:p>
         </p:txBody>
       </p:sp>
+      <p:sp>
+        <p:nvSpPr>
+          <p:cNvPr id="26" name="Slide Number Placeholder 25"/>
+          <p:cNvSpPr>
+            <a:spLocks noGrp="1"/>
+          </p:cNvSpPr>
+          <p:nvPr>
+            <p:ph type="sldNum" sz="quarter" idx="12"/>
+          </p:nvPr>
+        </p:nvSpPr>
+        <p:spPr/>
+        <p:txBody>
+          <a:bodyPr/>
+          <a:lstStyle/>
+          <a:p>
+            <a:fld id="{8D57FA42-4C96-40D0-968E-816322FE8D57}" type="slidenum">
+              <a:rPr lang="en-US" smtClean="0"/>
+              <a:t>2</a:t>
+            </a:fld>
+            <a:endParaRPr lang="en-US"/>
+          </a:p>
+        </p:txBody>
+      </p:sp>
     </p:spTree>
     <p:extLst>
       <p:ext uri="{BB962C8B-B14F-4D97-AF65-F5344CB8AC3E}">
@@ -4129,6 +4612,13 @@
   <p:clrMapOvr>
     <a:masterClrMapping/>
   </p:clrMapOvr>
+  <p:timing>
+    <p:tnLst>
+      <p:par>
+        <p:cTn id="1" dur="indefinite" restart="never" nodeType="tmRoot"/>
+      </p:par>
+    </p:tnLst>
+  </p:timing>
 </p:sld>
 </file>
 
@@ -4393,8 +4883,8 @@
           </p:nvSpPr>
           <p:spPr>
             <a:xfrm>
-              <a:off x="5205846" y="2060864"/>
-              <a:ext cx="1752600" cy="1596736"/>
+              <a:off x="4928754" y="2060864"/>
+              <a:ext cx="2234046" cy="1863436"/>
             </a:xfrm>
             <a:prstGeom prst="diamond">
               <a:avLst/>
@@ -4433,7 +4923,15 @@
                     <a:schemeClr val="tx1"/>
                   </a:solidFill>
                 </a:rPr>
-                <a:t>Emp. receives Email for Pending Approval</a:t>
+                <a:t>Employee Registration </a:t>
+              </a:r>
+              <a:r>
+                <a:rPr lang="en-US" sz="1400" dirty="0">
+                  <a:solidFill>
+                    <a:schemeClr val="tx1"/>
+                  </a:solidFill>
+                </a:rPr>
+                <a:t>approved ? </a:t>
               </a:r>
             </a:p>
           </p:txBody>
@@ -4784,8 +5282,8 @@
           </p:nvCxnSpPr>
           <p:spPr>
             <a:xfrm>
-              <a:off x="6958446" y="2859232"/>
-              <a:ext cx="1004454" cy="306532"/>
+              <a:off x="7162800" y="2992582"/>
+              <a:ext cx="800100" cy="173182"/>
             </a:xfrm>
             <a:prstGeom prst="bentConnector2">
               <a:avLst/>
@@ -4820,8 +5318,8 @@
           </p:nvCxnSpPr>
           <p:spPr>
             <a:xfrm rot="10800000" flipV="1">
-              <a:off x="3467100" y="2859232"/>
-              <a:ext cx="1738746" cy="306532"/>
+              <a:off x="3467100" y="2992582"/>
+              <a:ext cx="1461654" cy="173182"/>
             </a:xfrm>
             <a:prstGeom prst="bentConnector2">
               <a:avLst/>
@@ -4997,8 +5495,8 @@
           </p:nvSpPr>
           <p:spPr>
             <a:xfrm>
-              <a:off x="3609729" y="2274457"/>
-              <a:ext cx="1959383" cy="584775"/>
+              <a:off x="4358762" y="2536844"/>
+              <a:ext cx="452047" cy="338554"/>
             </a:xfrm>
             <a:prstGeom prst="rect">
               <a:avLst/>
@@ -5013,14 +5511,7 @@
             <a:p>
               <a:r>
                 <a:rPr lang="en-US" sz="1600" dirty="0" smtClean="0"/>
-                <a:t>Auth. Emp. approves </a:t>
-              </a:r>
-              <a:br>
-                <a:rPr lang="en-US" sz="1600" dirty="0" smtClean="0"/>
-              </a:br>
-              <a:r>
-                <a:rPr lang="en-US" sz="1600" dirty="0" smtClean="0"/>
-                <a:t>registration</a:t>
+                <a:t>Yes</a:t>
               </a:r>
               <a:endParaRPr lang="en-US" sz="1600" dirty="0"/>
             </a:p>
@@ -5034,8 +5525,8 @@
           </p:nvSpPr>
           <p:spPr>
             <a:xfrm>
-              <a:off x="6982691" y="2290623"/>
-              <a:ext cx="1760931" cy="584775"/>
+              <a:off x="7162800" y="2536844"/>
+              <a:ext cx="426720" cy="338554"/>
             </a:xfrm>
             <a:prstGeom prst="rect">
               <a:avLst/>
@@ -5050,14 +5541,7 @@
             <a:p>
               <a:r>
                 <a:rPr lang="en-US" sz="1600" dirty="0" smtClean="0"/>
-                <a:t>Auth. Emp.  rejects</a:t>
-              </a:r>
-              <a:br>
-                <a:rPr lang="en-US" sz="1600" dirty="0" smtClean="0"/>
-              </a:br>
-              <a:r>
-                <a:rPr lang="en-US" sz="1600" dirty="0" smtClean="0"/>
-                <a:t>registration</a:t>
+                <a:t>No</a:t>
               </a:r>
               <a:endParaRPr lang="en-US" sz="1600" dirty="0"/>
             </a:p>
@@ -5094,6 +5578,29 @@
           </a:p>
         </p:txBody>
       </p:sp>
+      <p:sp>
+        <p:nvSpPr>
+          <p:cNvPr id="32" name="Slide Number Placeholder 31"/>
+          <p:cNvSpPr>
+            <a:spLocks noGrp="1"/>
+          </p:cNvSpPr>
+          <p:nvPr>
+            <p:ph type="sldNum" sz="quarter" idx="12"/>
+          </p:nvPr>
+        </p:nvSpPr>
+        <p:spPr/>
+        <p:txBody>
+          <a:bodyPr/>
+          <a:lstStyle/>
+          <a:p>
+            <a:fld id="{8D57FA42-4C96-40D0-968E-816322FE8D57}" type="slidenum">
+              <a:rPr lang="en-US" smtClean="0"/>
+              <a:t>3</a:t>
+            </a:fld>
+            <a:endParaRPr lang="en-US"/>
+          </a:p>
+        </p:txBody>
+      </p:sp>
     </p:spTree>
     <p:extLst>
       <p:ext uri="{BB962C8B-B14F-4D97-AF65-F5344CB8AC3E}">
@@ -5104,6 +5611,13 @@
   <p:clrMapOvr>
     <a:masterClrMapping/>
   </p:clrMapOvr>
+  <p:timing>
+    <p:tnLst>
+      <p:par>
+        <p:cTn id="1" dur="indefinite" restart="never" nodeType="tmRoot"/>
+      </p:par>
+    </p:tnLst>
+  </p:timing>
 </p:sld>
 </file>
 
@@ -5163,9 +5677,9 @@
         <p:grpSpPr>
           <a:xfrm>
             <a:off x="512618" y="838200"/>
-            <a:ext cx="8844047" cy="5888725"/>
+            <a:ext cx="8886909" cy="5888725"/>
             <a:chOff x="512618" y="838200"/>
-            <a:chExt cx="8844047" cy="5888725"/>
+            <a:chExt cx="8886909" cy="5888725"/>
           </a:xfrm>
         </p:grpSpPr>
         <p:sp>
@@ -6531,13 +7045,16 @@
                     <a:schemeClr val="tx1"/>
                   </a:solidFill>
                 </a:rPr>
-                <a:t>User gets Email  for Pending Approval</a:t>
+                <a:t>Trans. approved </a:t>
               </a:r>
-              <a:endParaRPr lang="en-US" sz="1200" dirty="0">
-                <a:solidFill>
-                  <a:schemeClr val="tx1"/>
-                </a:solidFill>
-              </a:endParaRPr>
+              <a:r>
+                <a:rPr lang="en-US" sz="1200" dirty="0">
+                  <a:solidFill>
+                    <a:schemeClr val="tx1"/>
+                  </a:solidFill>
+                </a:rPr>
+                <a:t>? </a:t>
+              </a:r>
             </a:p>
           </p:txBody>
         </p:sp>
@@ -6981,8 +7498,8 @@
           </p:nvSpPr>
           <p:spPr>
             <a:xfrm>
-              <a:off x="7090930" y="4935074"/>
-              <a:ext cx="933449" cy="830997"/>
+              <a:off x="7263247" y="5062574"/>
+              <a:ext cx="933449" cy="276999"/>
             </a:xfrm>
             <a:prstGeom prst="rect">
               <a:avLst/>
@@ -6997,17 +7514,8 @@
             <a:p>
               <a:r>
                 <a:rPr lang="en-US" sz="1200" dirty="0" smtClean="0"/>
-                <a:t>Auth. Emp. approves </a:t>
+                <a:t>Yes</a:t>
               </a:r>
-              <a:br>
-                <a:rPr lang="en-US" sz="1200" dirty="0" smtClean="0"/>
-              </a:br>
-              <a:r>
-                <a:rPr lang="en-US" sz="1200" dirty="0" smtClean="0"/>
-                <a:t>Trans.</a:t>
-              </a:r>
-            </a:p>
-            <a:p>
               <a:endParaRPr lang="en-US" sz="1200" dirty="0"/>
             </a:p>
           </p:txBody>
@@ -7056,8 +7564,8 @@
           </p:nvSpPr>
           <p:spPr>
             <a:xfrm>
-              <a:off x="8314808" y="3798333"/>
-              <a:ext cx="1041857" cy="830997"/>
+              <a:off x="8357670" y="4035135"/>
+              <a:ext cx="1041857" cy="276999"/>
             </a:xfrm>
             <a:prstGeom prst="rect">
               <a:avLst/>
@@ -7071,17 +7579,8 @@
             <a:p>
               <a:r>
                 <a:rPr lang="en-US" sz="1200" dirty="0" smtClean="0"/>
-                <a:t>Auth. Emp. rejects </a:t>
+                <a:t>No</a:t>
               </a:r>
-              <a:br>
-                <a:rPr lang="en-US" sz="1200" dirty="0" smtClean="0"/>
-              </a:br>
-              <a:r>
-                <a:rPr lang="en-US" sz="1200" dirty="0" smtClean="0"/>
-                <a:t>Trans.</a:t>
-              </a:r>
-            </a:p>
-            <a:p>
               <a:endParaRPr lang="en-US" sz="1200" dirty="0"/>
             </a:p>
           </p:txBody>
@@ -7158,6 +7657,29 @@
           </p:style>
         </p:cxnSp>
       </p:grpSp>
+      <p:sp>
+        <p:nvSpPr>
+          <p:cNvPr id="3" name="Slide Number Placeholder 2"/>
+          <p:cNvSpPr>
+            <a:spLocks noGrp="1"/>
+          </p:cNvSpPr>
+          <p:nvPr>
+            <p:ph type="sldNum" sz="quarter" idx="12"/>
+          </p:nvPr>
+        </p:nvSpPr>
+        <p:spPr/>
+        <p:txBody>
+          <a:bodyPr/>
+          <a:lstStyle/>
+          <a:p>
+            <a:fld id="{8D57FA42-4C96-40D0-968E-816322FE8D57}" type="slidenum">
+              <a:rPr lang="en-US" smtClean="0"/>
+              <a:t>4</a:t>
+            </a:fld>
+            <a:endParaRPr lang="en-US"/>
+          </a:p>
+        </p:txBody>
+      </p:sp>
     </p:spTree>
     <p:extLst>
       <p:ext uri="{BB962C8B-B14F-4D97-AF65-F5344CB8AC3E}">
@@ -7168,6 +7690,13 @@
   <p:clrMapOvr>
     <a:masterClrMapping/>
   </p:clrMapOvr>
+  <p:timing>
+    <p:tnLst>
+      <p:par>
+        <p:cTn id="1" dur="indefinite" restart="never" nodeType="tmRoot"/>
+      </p:par>
+    </p:tnLst>
+  </p:timing>
 </p:sld>
 </file>
 
@@ -8186,6 +8715,29 @@
           </p:style>
         </p:cxnSp>
       </p:grpSp>
+      <p:sp>
+        <p:nvSpPr>
+          <p:cNvPr id="7" name="Slide Number Placeholder 6"/>
+          <p:cNvSpPr>
+            <a:spLocks noGrp="1"/>
+          </p:cNvSpPr>
+          <p:nvPr>
+            <p:ph type="sldNum" sz="quarter" idx="12"/>
+          </p:nvPr>
+        </p:nvSpPr>
+        <p:spPr/>
+        <p:txBody>
+          <a:bodyPr/>
+          <a:lstStyle/>
+          <a:p>
+            <a:fld id="{8D57FA42-4C96-40D0-968E-816322FE8D57}" type="slidenum">
+              <a:rPr lang="en-US" smtClean="0"/>
+              <a:t>5</a:t>
+            </a:fld>
+            <a:endParaRPr lang="en-US"/>
+          </a:p>
+        </p:txBody>
+      </p:sp>
     </p:spTree>
     <p:extLst>
       <p:ext uri="{BB962C8B-B14F-4D97-AF65-F5344CB8AC3E}">
@@ -8196,6 +8748,409 @@
   <p:clrMapOvr>
     <a:masterClrMapping/>
   </p:clrMapOvr>
+  <p:timing>
+    <p:tnLst>
+      <p:par>
+        <p:cTn id="1" dur="indefinite" restart="never" nodeType="tmRoot"/>
+      </p:par>
+    </p:tnLst>
+  </p:timing>
+</p:sld>
+</file>
+
+<file path=ppt/slides/slide6.xml><?xml version="1.0" encoding="utf-8"?>
+<p:sld xmlns:a="http://schemas.openxmlformats.org/drawingml/2006/main" xmlns:r="http://schemas.openxmlformats.org/officeDocument/2006/relationships" xmlns:p="http://schemas.openxmlformats.org/presentationml/2006/main">
+  <p:cSld>
+    <p:spTree>
+      <p:nvGrpSpPr>
+        <p:cNvPr id="1" name=""/>
+        <p:cNvGrpSpPr/>
+        <p:nvPr/>
+      </p:nvGrpSpPr>
+      <p:grpSpPr>
+        <a:xfrm>
+          <a:off x="0" y="0"/>
+          <a:ext cx="0" cy="0"/>
+          <a:chOff x="0" y="0"/>
+          <a:chExt cx="0" cy="0"/>
+        </a:xfrm>
+      </p:grpSpPr>
+      <p:graphicFrame>
+        <p:nvGraphicFramePr>
+          <p:cNvPr id="3" name="Table 2"/>
+          <p:cNvGraphicFramePr>
+            <a:graphicFrameLocks noGrp="1"/>
+          </p:cNvGraphicFramePr>
+          <p:nvPr>
+            <p:extLst>
+              <p:ext uri="{D42A27DB-BD31-4B8C-83A1-F6EECF244321}">
+                <p14:modId xmlns:p14="http://schemas.microsoft.com/office/powerpoint/2010/main" val="1285495805"/>
+              </p:ext>
+            </p:extLst>
+          </p:nvPr>
+        </p:nvGraphicFramePr>
+        <p:xfrm>
+          <a:off x="1066800" y="838200"/>
+          <a:ext cx="6858000" cy="5313680"/>
+        </p:xfrm>
+        <a:graphic>
+          <a:graphicData uri="http://schemas.openxmlformats.org/drawingml/2006/table">
+            <a:tbl>
+              <a:tblPr firstRow="1" bandRow="1">
+                <a:tableStyleId>{5C22544A-7EE6-4342-B048-85BDC9FD1C3A}</a:tableStyleId>
+              </a:tblPr>
+              <a:tblGrid>
+                <a:gridCol w="3048000"/>
+                <a:gridCol w="3810000"/>
+              </a:tblGrid>
+              <a:tr h="218440">
+                <a:tc>
+                  <a:txBody>
+                    <a:bodyPr/>
+                    <a:lstStyle/>
+                    <a:p>
+                      <a:r>
+                        <a:rPr lang="en-US" dirty="0" smtClean="0"/>
+                        <a:t>Name </a:t>
+                      </a:r>
+                      <a:endParaRPr lang="en-US" dirty="0"/>
+                    </a:p>
+                  </a:txBody>
+                  <a:tcPr/>
+                </a:tc>
+                <a:tc>
+                  <a:txBody>
+                    <a:bodyPr/>
+                    <a:lstStyle/>
+                    <a:p>
+                      <a:r>
+                        <a:rPr lang="en-US" dirty="0" smtClean="0"/>
+                        <a:t>What is the name of the use-case?</a:t>
+                      </a:r>
+                      <a:endParaRPr lang="en-US" dirty="0"/>
+                    </a:p>
+                  </a:txBody>
+                  <a:tcPr/>
+                </a:tc>
+              </a:tr>
+              <a:tr h="370840">
+                <a:tc>
+                  <a:txBody>
+                    <a:bodyPr/>
+                    <a:lstStyle/>
+                    <a:p>
+                      <a:r>
+                        <a:rPr lang="en-US" sz="1600" dirty="0" smtClean="0"/>
+                        <a:t>Goal</a:t>
+                      </a:r>
+                      <a:endParaRPr lang="en-US" sz="1600" dirty="0"/>
+                    </a:p>
+                  </a:txBody>
+                  <a:tcPr/>
+                </a:tc>
+                <a:tc>
+                  <a:txBody>
+                    <a:bodyPr/>
+                    <a:lstStyle/>
+                    <a:p>
+                      <a:r>
+                        <a:rPr lang="en-US" sz="1600" dirty="0" smtClean="0"/>
+                        <a:t>Customer / Employee registration </a:t>
+                      </a:r>
+                      <a:endParaRPr lang="en-US" sz="1600" dirty="0"/>
+                    </a:p>
+                  </a:txBody>
+                  <a:tcPr/>
+                </a:tc>
+              </a:tr>
+              <a:tr h="370840">
+                <a:tc>
+                  <a:txBody>
+                    <a:bodyPr/>
+                    <a:lstStyle/>
+                    <a:p>
+                      <a:r>
+                        <a:rPr lang="en-US" sz="1600" dirty="0" smtClean="0"/>
+                        <a:t>Actors</a:t>
+                      </a:r>
+                      <a:endParaRPr lang="en-US" sz="1600" dirty="0"/>
+                    </a:p>
+                  </a:txBody>
+                  <a:tcPr/>
+                </a:tc>
+                <a:tc>
+                  <a:txBody>
+                    <a:bodyPr/>
+                    <a:lstStyle/>
+                    <a:p>
+                      <a:r>
+                        <a:rPr lang="en-US" sz="1600" dirty="0" smtClean="0"/>
+                        <a:t>Customer, Employee</a:t>
+                      </a:r>
+                      <a:endParaRPr lang="en-US" sz="1600" dirty="0"/>
+                    </a:p>
+                  </a:txBody>
+                  <a:tcPr/>
+                </a:tc>
+              </a:tr>
+              <a:tr h="370840">
+                <a:tc>
+                  <a:txBody>
+                    <a:bodyPr/>
+                    <a:lstStyle/>
+                    <a:p>
+                      <a:r>
+                        <a:rPr lang="en-US" sz="1600" dirty="0" smtClean="0"/>
+                        <a:t>Pre-conditions</a:t>
+                      </a:r>
+                      <a:endParaRPr lang="en-US" sz="1600" dirty="0"/>
+                    </a:p>
+                  </a:txBody>
+                  <a:tcPr/>
+                </a:tc>
+                <a:tc>
+                  <a:txBody>
+                    <a:bodyPr/>
+                    <a:lstStyle/>
+                    <a:p>
+                      <a:r>
+                        <a:rPr lang="en-US" sz="1600" dirty="0" smtClean="0"/>
+                        <a:t>Customer/Employee opens the Bank website in a browser</a:t>
+                      </a:r>
+                      <a:endParaRPr lang="en-US" sz="1600" dirty="0"/>
+                    </a:p>
+                  </a:txBody>
+                  <a:tcPr/>
+                </a:tc>
+              </a:tr>
+              <a:tr h="370840">
+                <a:tc>
+                  <a:txBody>
+                    <a:bodyPr/>
+                    <a:lstStyle/>
+                    <a:p>
+                      <a:r>
+                        <a:rPr lang="en-US" sz="1600" dirty="0" smtClean="0"/>
+                        <a:t>Main course of Execution</a:t>
+                      </a:r>
+                      <a:endParaRPr lang="en-US" sz="1600" dirty="0"/>
+                    </a:p>
+                  </a:txBody>
+                  <a:tcPr/>
+                </a:tc>
+                <a:tc>
+                  <a:txBody>
+                    <a:bodyPr/>
+                    <a:lstStyle/>
+                    <a:p>
+                      <a:r>
+                        <a:rPr lang="en-US" sz="1600" dirty="0" smtClean="0"/>
+                        <a:t>Customer/Employee sign</a:t>
+                      </a:r>
+                      <a:r>
+                        <a:rPr lang="en-US" sz="1600" baseline="0" dirty="0" smtClean="0"/>
+                        <a:t>-up, Approval by authorized Employee, Customer/Employee receiving Email for success (including File with TANs for Customer)</a:t>
+                      </a:r>
+                      <a:endParaRPr lang="en-US" sz="1600" dirty="0"/>
+                    </a:p>
+                  </a:txBody>
+                  <a:tcPr/>
+                </a:tc>
+              </a:tr>
+              <a:tr h="370840">
+                <a:tc>
+                  <a:txBody>
+                    <a:bodyPr/>
+                    <a:lstStyle/>
+                    <a:p>
+                      <a:r>
+                        <a:rPr lang="en-US" sz="1600" dirty="0" smtClean="0"/>
+                        <a:t>Alternate Courses</a:t>
+                      </a:r>
+                      <a:endParaRPr lang="en-US" sz="1600" dirty="0"/>
+                    </a:p>
+                  </a:txBody>
+                  <a:tcPr/>
+                </a:tc>
+                <a:tc>
+                  <a:txBody>
+                    <a:bodyPr/>
+                    <a:lstStyle/>
+                    <a:p>
+                      <a:r>
+                        <a:rPr lang="en-US" sz="1600" dirty="0" smtClean="0"/>
+                        <a:t>Customer/Employee sign</a:t>
+                      </a:r>
+                      <a:r>
+                        <a:rPr lang="en-US" sz="1600" baseline="0" dirty="0" smtClean="0"/>
+                        <a:t>-up, Rejection by authorized Employee, Customer/Employee receiving Email for failure</a:t>
+                      </a:r>
+                      <a:endParaRPr lang="en-US" sz="1600" dirty="0"/>
+                    </a:p>
+                  </a:txBody>
+                  <a:tcPr/>
+                </a:tc>
+              </a:tr>
+              <a:tr h="370840">
+                <a:tc>
+                  <a:txBody>
+                    <a:bodyPr/>
+                    <a:lstStyle/>
+                    <a:p>
+                      <a:r>
+                        <a:rPr lang="en-US" sz="1600" dirty="0" smtClean="0"/>
+                        <a:t>Exceptions</a:t>
+                      </a:r>
+                      <a:endParaRPr lang="en-US" sz="1600" dirty="0"/>
+                    </a:p>
+                  </a:txBody>
+                  <a:tcPr/>
+                </a:tc>
+                <a:tc>
+                  <a:txBody>
+                    <a:bodyPr/>
+                    <a:lstStyle/>
+                    <a:p>
+                      <a:r>
+                        <a:rPr lang="en-US" sz="1600" dirty="0" smtClean="0"/>
+                        <a:t>SQL Injection,</a:t>
+                      </a:r>
+                      <a:r>
+                        <a:rPr lang="en-US" sz="1600" baseline="0" dirty="0" smtClean="0"/>
+                        <a:t> Email Injection, Vulnerability with random numbers</a:t>
+                      </a:r>
+                      <a:endParaRPr lang="en-US" sz="1600" dirty="0"/>
+                    </a:p>
+                  </a:txBody>
+                  <a:tcPr/>
+                </a:tc>
+              </a:tr>
+              <a:tr h="370840">
+                <a:tc>
+                  <a:txBody>
+                    <a:bodyPr/>
+                    <a:lstStyle/>
+                    <a:p>
+                      <a:r>
+                        <a:rPr lang="en-US" sz="1600" dirty="0" smtClean="0"/>
+                        <a:t>Post-conditions</a:t>
+                      </a:r>
+                      <a:endParaRPr lang="en-US" sz="1600" dirty="0"/>
+                    </a:p>
+                  </a:txBody>
+                  <a:tcPr/>
+                </a:tc>
+                <a:tc>
+                  <a:txBody>
+                    <a:bodyPr/>
+                    <a:lstStyle/>
+                    <a:p>
+                      <a:r>
+                        <a:rPr lang="en-US" sz="1600" dirty="0" smtClean="0"/>
+                        <a:t>Customer/Employee can login/logout to the Bank website and perform operations.</a:t>
+                      </a:r>
+                      <a:endParaRPr lang="en-US" sz="1600" dirty="0"/>
+                    </a:p>
+                  </a:txBody>
+                  <a:tcPr/>
+                </a:tc>
+              </a:tr>
+              <a:tr h="370840">
+                <a:tc>
+                  <a:txBody>
+                    <a:bodyPr/>
+                    <a:lstStyle/>
+                    <a:p>
+                      <a:r>
+                        <a:rPr lang="en-US" sz="1600" dirty="0" smtClean="0"/>
+                        <a:t>Data formats</a:t>
+                      </a:r>
+                      <a:r>
+                        <a:rPr lang="en-US" sz="1600" baseline="0" dirty="0" smtClean="0"/>
+                        <a:t> used</a:t>
+                      </a:r>
+                      <a:endParaRPr lang="en-US" sz="1600" dirty="0"/>
+                    </a:p>
+                  </a:txBody>
+                  <a:tcPr/>
+                </a:tc>
+                <a:tc>
+                  <a:txBody>
+                    <a:bodyPr/>
+                    <a:lstStyle/>
+                    <a:p>
+                      <a:r>
+                        <a:rPr lang="en-US" sz="1600" dirty="0" smtClean="0"/>
+                        <a:t>Input - Customer/Employee</a:t>
+                      </a:r>
+                      <a:r>
+                        <a:rPr lang="en-US" sz="1600" baseline="0" dirty="0" smtClean="0"/>
+                        <a:t> </a:t>
+                      </a:r>
+                      <a:r>
+                        <a:rPr lang="en-US" sz="1600" dirty="0" smtClean="0"/>
+                        <a:t>details</a:t>
+                      </a:r>
+                    </a:p>
+                    <a:p>
+                      <a:r>
+                        <a:rPr lang="en-US" sz="1600" dirty="0" smtClean="0"/>
+                        <a:t>Output – 100 TANs of 15 characters</a:t>
+                      </a:r>
+                      <a:r>
+                        <a:rPr lang="en-US" sz="1600" baseline="0" dirty="0" smtClean="0"/>
+                        <a:t> each</a:t>
+                      </a:r>
+                      <a:endParaRPr lang="en-US" sz="1600" dirty="0"/>
+                    </a:p>
+                  </a:txBody>
+                  <a:tcPr/>
+                </a:tc>
+              </a:tr>
+            </a:tbl>
+          </a:graphicData>
+        </a:graphic>
+      </p:graphicFrame>
+      <p:sp>
+        <p:nvSpPr>
+          <p:cNvPr id="4" name="Slide Number Placeholder 3"/>
+          <p:cNvSpPr>
+            <a:spLocks noGrp="1"/>
+          </p:cNvSpPr>
+          <p:nvPr>
+            <p:ph type="sldNum" sz="quarter" idx="12"/>
+          </p:nvPr>
+        </p:nvSpPr>
+        <p:spPr/>
+        <p:txBody>
+          <a:bodyPr/>
+          <a:lstStyle/>
+          <a:p>
+            <a:fld id="{8D57FA42-4C96-40D0-968E-816322FE8D57}" type="slidenum">
+              <a:rPr lang="en-US" smtClean="0"/>
+              <a:t>6</a:t>
+            </a:fld>
+            <a:endParaRPr lang="en-US"/>
+          </a:p>
+        </p:txBody>
+      </p:sp>
+    </p:spTree>
+    <p:extLst>
+      <p:ext uri="{BB962C8B-B14F-4D97-AF65-F5344CB8AC3E}">
+        <p14:creationId xmlns:p14="http://schemas.microsoft.com/office/powerpoint/2010/main" val="680432790"/>
+      </p:ext>
+    </p:extLst>
+  </p:cSld>
+  <p:clrMapOvr>
+    <a:masterClrMapping/>
+  </p:clrMapOvr>
+  <p:timing>
+    <p:tnLst>
+      <p:par>
+        <p:cTn id="1" dur="indefinite" restart="never" nodeType="tmRoot"/>
+      </p:par>
+    </p:tnLst>
+  </p:timing>
 </p:sld>
 </file>
 
@@ -8482,4 +9437,289 @@
   <a:objectDefaults/>
   <a:extraClrSchemeLst/>
 </a:theme>
+</file>
+
+<file path=ppt/theme/theme2.xml><?xml version="1.0" encoding="utf-8"?>
+<a:theme xmlns:a="http://schemas.openxmlformats.org/drawingml/2006/main" name="Office Theme">
+  <a:themeElements>
+    <a:clrScheme name="Office">
+      <a:dk1>
+        <a:sysClr val="windowText" lastClr="000000"/>
+      </a:dk1>
+      <a:lt1>
+        <a:sysClr val="window" lastClr="FFFFFF"/>
+      </a:lt1>
+      <a:dk2>
+        <a:srgbClr val="1F497D"/>
+      </a:dk2>
+      <a:lt2>
+        <a:srgbClr val="EEECE1"/>
+      </a:lt2>
+      <a:accent1>
+        <a:srgbClr val="4F81BD"/>
+      </a:accent1>
+      <a:accent2>
+        <a:srgbClr val="C0504D"/>
+      </a:accent2>
+      <a:accent3>
+        <a:srgbClr val="9BBB59"/>
+      </a:accent3>
+      <a:accent4>
+        <a:srgbClr val="8064A2"/>
+      </a:accent4>
+      <a:accent5>
+        <a:srgbClr val="4BACC6"/>
+      </a:accent5>
+      <a:accent6>
+        <a:srgbClr val="F79646"/>
+      </a:accent6>
+      <a:hlink>
+        <a:srgbClr val="0000FF"/>
+      </a:hlink>
+      <a:folHlink>
+        <a:srgbClr val="800080"/>
+      </a:folHlink>
+    </a:clrScheme>
+    <a:fontScheme name="Office">
+      <a:majorFont>
+        <a:latin typeface="Calibri"/>
+        <a:ea typeface=""/>
+        <a:cs typeface=""/>
+        <a:font script="Jpan" typeface="ＭＳ Ｐゴシック"/>
+        <a:font script="Hang" typeface="맑은 고딕"/>
+        <a:font script="Hans" typeface="宋体"/>
+        <a:font script="Hant" typeface="新細明體"/>
+        <a:font script="Arab" typeface="Times New Roman"/>
+        <a:font script="Hebr" typeface="Times New Roman"/>
+        <a:font script="Thai" typeface="Angsana New"/>
+        <a:font script="Ethi" typeface="Nyala"/>
+        <a:font script="Beng" typeface="Vrinda"/>
+        <a:font script="Gujr" typeface="Shruti"/>
+        <a:font script="Khmr" typeface="MoolBoran"/>
+        <a:font script="Knda" typeface="Tunga"/>
+        <a:font script="Guru" typeface="Raavi"/>
+        <a:font script="Cans" typeface="Euphemia"/>
+        <a:font script="Cher" typeface="Plantagenet Cherokee"/>
+        <a:font script="Yiii" typeface="Microsoft Yi Baiti"/>
+        <a:font script="Tibt" typeface="Microsoft Himalaya"/>
+        <a:font script="Thaa" typeface="MV Boli"/>
+        <a:font script="Deva" typeface="Mangal"/>
+        <a:font script="Telu" typeface="Gautami"/>
+        <a:font script="Taml" typeface="Latha"/>
+        <a:font script="Syrc" typeface="Estrangelo Edessa"/>
+        <a:font script="Orya" typeface="Kalinga"/>
+        <a:font script="Mlym" typeface="Kartika"/>
+        <a:font script="Laoo" typeface="DokChampa"/>
+        <a:font script="Sinh" typeface="Iskoola Pota"/>
+        <a:font script="Mong" typeface="Mongolian Baiti"/>
+        <a:font script="Viet" typeface="Times New Roman"/>
+        <a:font script="Uigh" typeface="Microsoft Uighur"/>
+        <a:font script="Geor" typeface="Sylfaen"/>
+      </a:majorFont>
+      <a:minorFont>
+        <a:latin typeface="Calibri"/>
+        <a:ea typeface=""/>
+        <a:cs typeface=""/>
+        <a:font script="Jpan" typeface="ＭＳ Ｐゴシック"/>
+        <a:font script="Hang" typeface="맑은 고딕"/>
+        <a:font script="Hans" typeface="宋体"/>
+        <a:font script="Hant" typeface="新細明體"/>
+        <a:font script="Arab" typeface="Arial"/>
+        <a:font script="Hebr" typeface="Arial"/>
+        <a:font script="Thai" typeface="Cordia New"/>
+        <a:font script="Ethi" typeface="Nyala"/>
+        <a:font script="Beng" typeface="Vrinda"/>
+        <a:font script="Gujr" typeface="Shruti"/>
+        <a:font script="Khmr" typeface="DaunPenh"/>
+        <a:font script="Knda" typeface="Tunga"/>
+        <a:font script="Guru" typeface="Raavi"/>
+        <a:font script="Cans" typeface="Euphemia"/>
+        <a:font script="Cher" typeface="Plantagenet Cherokee"/>
+        <a:font script="Yiii" typeface="Microsoft Yi Baiti"/>
+        <a:font script="Tibt" typeface="Microsoft Himalaya"/>
+        <a:font script="Thaa" typeface="MV Boli"/>
+        <a:font script="Deva" typeface="Mangal"/>
+        <a:font script="Telu" typeface="Gautami"/>
+        <a:font script="Taml" typeface="Latha"/>
+        <a:font script="Syrc" typeface="Estrangelo Edessa"/>
+        <a:font script="Orya" typeface="Kalinga"/>
+        <a:font script="Mlym" typeface="Kartika"/>
+        <a:font script="Laoo" typeface="DokChampa"/>
+        <a:font script="Sinh" typeface="Iskoola Pota"/>
+        <a:font script="Mong" typeface="Mongolian Baiti"/>
+        <a:font script="Viet" typeface="Arial"/>
+        <a:font script="Uigh" typeface="Microsoft Uighur"/>
+        <a:font script="Geor" typeface="Sylfaen"/>
+      </a:minorFont>
+    </a:fontScheme>
+    <a:fmtScheme name="Office">
+      <a:fillStyleLst>
+        <a:solidFill>
+          <a:schemeClr val="phClr"/>
+        </a:solidFill>
+        <a:gradFill rotWithShape="1">
+          <a:gsLst>
+            <a:gs pos="0">
+              <a:schemeClr val="phClr">
+                <a:tint val="50000"/>
+                <a:satMod val="300000"/>
+              </a:schemeClr>
+            </a:gs>
+            <a:gs pos="35000">
+              <a:schemeClr val="phClr">
+                <a:tint val="37000"/>
+                <a:satMod val="300000"/>
+              </a:schemeClr>
+            </a:gs>
+            <a:gs pos="100000">
+              <a:schemeClr val="phClr">
+                <a:tint val="15000"/>
+                <a:satMod val="350000"/>
+              </a:schemeClr>
+            </a:gs>
+          </a:gsLst>
+          <a:lin ang="16200000" scaled="1"/>
+        </a:gradFill>
+        <a:gradFill rotWithShape="1">
+          <a:gsLst>
+            <a:gs pos="0">
+              <a:schemeClr val="phClr">
+                <a:shade val="51000"/>
+                <a:satMod val="130000"/>
+              </a:schemeClr>
+            </a:gs>
+            <a:gs pos="80000">
+              <a:schemeClr val="phClr">
+                <a:shade val="93000"/>
+                <a:satMod val="130000"/>
+              </a:schemeClr>
+            </a:gs>
+            <a:gs pos="100000">
+              <a:schemeClr val="phClr">
+                <a:shade val="94000"/>
+                <a:satMod val="135000"/>
+              </a:schemeClr>
+            </a:gs>
+          </a:gsLst>
+          <a:lin ang="16200000" scaled="0"/>
+        </a:gradFill>
+      </a:fillStyleLst>
+      <a:lnStyleLst>
+        <a:ln w="9525" cap="flat" cmpd="sng" algn="ctr">
+          <a:solidFill>
+            <a:schemeClr val="phClr">
+              <a:shade val="95000"/>
+              <a:satMod val="105000"/>
+            </a:schemeClr>
+          </a:solidFill>
+          <a:prstDash val="solid"/>
+        </a:ln>
+        <a:ln w="25400" cap="flat" cmpd="sng" algn="ctr">
+          <a:solidFill>
+            <a:schemeClr val="phClr"/>
+          </a:solidFill>
+          <a:prstDash val="solid"/>
+        </a:ln>
+        <a:ln w="38100" cap="flat" cmpd="sng" algn="ctr">
+          <a:solidFill>
+            <a:schemeClr val="phClr"/>
+          </a:solidFill>
+          <a:prstDash val="solid"/>
+        </a:ln>
+      </a:lnStyleLst>
+      <a:effectStyleLst>
+        <a:effectStyle>
+          <a:effectLst>
+            <a:outerShdw blurRad="40000" dist="20000" dir="5400000" rotWithShape="0">
+              <a:srgbClr val="000000">
+                <a:alpha val="38000"/>
+              </a:srgbClr>
+            </a:outerShdw>
+          </a:effectLst>
+        </a:effectStyle>
+        <a:effectStyle>
+          <a:effectLst>
+            <a:outerShdw blurRad="40000" dist="23000" dir="5400000" rotWithShape="0">
+              <a:srgbClr val="000000">
+                <a:alpha val="35000"/>
+              </a:srgbClr>
+            </a:outerShdw>
+          </a:effectLst>
+        </a:effectStyle>
+        <a:effectStyle>
+          <a:effectLst>
+            <a:outerShdw blurRad="40000" dist="23000" dir="5400000" rotWithShape="0">
+              <a:srgbClr val="000000">
+                <a:alpha val="35000"/>
+              </a:srgbClr>
+            </a:outerShdw>
+          </a:effectLst>
+          <a:scene3d>
+            <a:camera prst="orthographicFront">
+              <a:rot lat="0" lon="0" rev="0"/>
+            </a:camera>
+            <a:lightRig rig="threePt" dir="t">
+              <a:rot lat="0" lon="0" rev="1200000"/>
+            </a:lightRig>
+          </a:scene3d>
+          <a:sp3d>
+            <a:bevelT w="63500" h="25400"/>
+          </a:sp3d>
+        </a:effectStyle>
+      </a:effectStyleLst>
+      <a:bgFillStyleLst>
+        <a:solidFill>
+          <a:schemeClr val="phClr"/>
+        </a:solidFill>
+        <a:gradFill rotWithShape="1">
+          <a:gsLst>
+            <a:gs pos="0">
+              <a:schemeClr val="phClr">
+                <a:tint val="40000"/>
+                <a:satMod val="350000"/>
+              </a:schemeClr>
+            </a:gs>
+            <a:gs pos="40000">
+              <a:schemeClr val="phClr">
+                <a:tint val="45000"/>
+                <a:shade val="99000"/>
+                <a:satMod val="350000"/>
+              </a:schemeClr>
+            </a:gs>
+            <a:gs pos="100000">
+              <a:schemeClr val="phClr">
+                <a:shade val="20000"/>
+                <a:satMod val="255000"/>
+              </a:schemeClr>
+            </a:gs>
+          </a:gsLst>
+          <a:path path="circle">
+            <a:fillToRect l="50000" t="-80000" r="50000" b="180000"/>
+          </a:path>
+        </a:gradFill>
+        <a:gradFill rotWithShape="1">
+          <a:gsLst>
+            <a:gs pos="0">
+              <a:schemeClr val="phClr">
+                <a:tint val="80000"/>
+                <a:satMod val="300000"/>
+              </a:schemeClr>
+            </a:gs>
+            <a:gs pos="100000">
+              <a:schemeClr val="phClr">
+                <a:shade val="30000"/>
+                <a:satMod val="200000"/>
+              </a:schemeClr>
+            </a:gs>
+          </a:gsLst>
+          <a:path path="circle">
+            <a:fillToRect l="50000" t="50000" r="50000" b="50000"/>
+          </a:path>
+        </a:gradFill>
+      </a:bgFillStyleLst>
+    </a:fmtScheme>
+  </a:themeElements>
+  <a:objectDefaults/>
+  <a:extraClrSchemeLst/>
+</a:theme>
 </file>
</xml_diff>